<commit_message>
Major changes to README and Get Started vignette
</commit_message>
<xml_diff>
--- a/vignettes/figs/data_sources.pptx
+++ b/vignettes/figs/data_sources.pptx
@@ -272,7 +272,7 @@
           <a:p>
             <a:fld id="{97E63344-2A16-4308-B317-2F0EBEB96E4F}" type="datetimeFigureOut">
               <a:rPr lang="en-GB" smtClean="0"/>
-              <a:t>04/08/2020</a:t>
+              <a:t>14/08/2020</a:t>
             </a:fld>
             <a:endParaRPr lang="en-GB"/>
           </a:p>
@@ -472,7 +472,7 @@
           <a:p>
             <a:fld id="{97E63344-2A16-4308-B317-2F0EBEB96E4F}" type="datetimeFigureOut">
               <a:rPr lang="en-GB" smtClean="0"/>
-              <a:t>04/08/2020</a:t>
+              <a:t>14/08/2020</a:t>
             </a:fld>
             <a:endParaRPr lang="en-GB"/>
           </a:p>
@@ -682,7 +682,7 @@
           <a:p>
             <a:fld id="{97E63344-2A16-4308-B317-2F0EBEB96E4F}" type="datetimeFigureOut">
               <a:rPr lang="en-GB" smtClean="0"/>
-              <a:t>04/08/2020</a:t>
+              <a:t>14/08/2020</a:t>
             </a:fld>
             <a:endParaRPr lang="en-GB"/>
           </a:p>
@@ -882,7 +882,7 @@
           <a:p>
             <a:fld id="{97E63344-2A16-4308-B317-2F0EBEB96E4F}" type="datetimeFigureOut">
               <a:rPr lang="en-GB" smtClean="0"/>
-              <a:t>04/08/2020</a:t>
+              <a:t>14/08/2020</a:t>
             </a:fld>
             <a:endParaRPr lang="en-GB"/>
           </a:p>
@@ -1158,7 +1158,7 @@
           <a:p>
             <a:fld id="{97E63344-2A16-4308-B317-2F0EBEB96E4F}" type="datetimeFigureOut">
               <a:rPr lang="en-GB" smtClean="0"/>
-              <a:t>04/08/2020</a:t>
+              <a:t>14/08/2020</a:t>
             </a:fld>
             <a:endParaRPr lang="en-GB"/>
           </a:p>
@@ -1426,7 +1426,7 @@
           <a:p>
             <a:fld id="{97E63344-2A16-4308-B317-2F0EBEB96E4F}" type="datetimeFigureOut">
               <a:rPr lang="en-GB" smtClean="0"/>
-              <a:t>04/08/2020</a:t>
+              <a:t>14/08/2020</a:t>
             </a:fld>
             <a:endParaRPr lang="en-GB"/>
           </a:p>
@@ -1841,7 +1841,7 @@
           <a:p>
             <a:fld id="{97E63344-2A16-4308-B317-2F0EBEB96E4F}" type="datetimeFigureOut">
               <a:rPr lang="en-GB" smtClean="0"/>
-              <a:t>04/08/2020</a:t>
+              <a:t>14/08/2020</a:t>
             </a:fld>
             <a:endParaRPr lang="en-GB"/>
           </a:p>
@@ -1983,7 +1983,7 @@
           <a:p>
             <a:fld id="{97E63344-2A16-4308-B317-2F0EBEB96E4F}" type="datetimeFigureOut">
               <a:rPr lang="en-GB" smtClean="0"/>
-              <a:t>04/08/2020</a:t>
+              <a:t>14/08/2020</a:t>
             </a:fld>
             <a:endParaRPr lang="en-GB"/>
           </a:p>
@@ -2096,7 +2096,7 @@
           <a:p>
             <a:fld id="{97E63344-2A16-4308-B317-2F0EBEB96E4F}" type="datetimeFigureOut">
               <a:rPr lang="en-GB" smtClean="0"/>
-              <a:t>04/08/2020</a:t>
+              <a:t>14/08/2020</a:t>
             </a:fld>
             <a:endParaRPr lang="en-GB"/>
           </a:p>
@@ -2409,7 +2409,7 @@
           <a:p>
             <a:fld id="{97E63344-2A16-4308-B317-2F0EBEB96E4F}" type="datetimeFigureOut">
               <a:rPr lang="en-GB" smtClean="0"/>
-              <a:t>04/08/2020</a:t>
+              <a:t>14/08/2020</a:t>
             </a:fld>
             <a:endParaRPr lang="en-GB"/>
           </a:p>
@@ -2698,7 +2698,7 @@
           <a:p>
             <a:fld id="{97E63344-2A16-4308-B317-2F0EBEB96E4F}" type="datetimeFigureOut">
               <a:rPr lang="en-GB" smtClean="0"/>
-              <a:t>04/08/2020</a:t>
+              <a:t>14/08/2020</a:t>
             </a:fld>
             <a:endParaRPr lang="en-GB"/>
           </a:p>
@@ -2941,7 +2941,7 @@
           <a:p>
             <a:fld id="{97E63344-2A16-4308-B317-2F0EBEB96E4F}" type="datetimeFigureOut">
               <a:rPr lang="en-GB" smtClean="0"/>
-              <a:t>04/08/2020</a:t>
+              <a:t>14/08/2020</a:t>
             </a:fld>
             <a:endParaRPr lang="en-GB"/>
           </a:p>
@@ -3748,7 +3748,7 @@
             </a:r>
             <a:r>
               <a:rPr lang="en-GB" dirty="0" err="1"/>
-              <a:t>medrxiv_data</a:t>
+              <a:t>preprint_data</a:t>
             </a:r>
             <a:r>
               <a:rPr lang="en-GB" dirty="0"/>
@@ -3828,7 +3828,7 @@
             <a:pPr algn="ctr"/>
             <a:r>
               <a:rPr lang="en-GB" dirty="0" err="1"/>
-              <a:t>medrxiv_data</a:t>
+              <a:t>preprint_data</a:t>
             </a:r>
             <a:r>
               <a:rPr lang="en-GB" dirty="0"/>
@@ -3880,7 +3880,7 @@
             </a:r>
             <a:r>
               <a:rPr lang="en-GB" dirty="0" err="1"/>
-              <a:t>medrxiv_data</a:t>
+              <a:t>preprint_data</a:t>
             </a:r>
             <a:r>
               <a:rPr lang="en-GB" dirty="0"/>
@@ -3939,7 +3939,7 @@
             </a:r>
             <a:r>
               <a:rPr lang="en-GB" dirty="0" err="1"/>
-              <a:t>medrxiv_data</a:t>
+              <a:t>preprint_data</a:t>
             </a:r>
             <a:r>
               <a:rPr lang="en-GB" dirty="0"/>
@@ -4303,6 +4303,21 @@
 </file>
 
 <file path=customXml/item1.xml><?xml version="1.0" encoding="utf-8"?>
+<p:properties xmlns:p="http://schemas.microsoft.com/office/2006/metadata/properties" xmlns:xsi="http://www.w3.org/2001/XMLSchema-instance" xmlns:pc="http://schemas.microsoft.com/office/infopath/2007/PartnerControls">
+  <documentManagement/>
+</p:properties>
+</file>
+
+<file path=customXml/item2.xml><?xml version="1.0" encoding="utf-8"?>
+<?mso-contentType ?>
+<FormTemplates xmlns="http://schemas.microsoft.com/sharepoint/v3/contenttype/forms">
+  <Display>DocumentLibraryForm</Display>
+  <Edit>DocumentLibraryForm</Edit>
+  <New>DocumentLibraryForm</New>
+</FormTemplates>
+</file>
+
+<file path=customXml/item3.xml><?xml version="1.0" encoding="utf-8"?>
 <ct:contentTypeSchema xmlns:ct="http://schemas.microsoft.com/office/2006/metadata/contentType" xmlns:ma="http://schemas.microsoft.com/office/2006/metadata/properties/metaAttributes" ct:_="" ma:_="" ma:contentTypeName="Document" ma:contentTypeID="0x010100AB879562A5253941BC4792E4BFFA7253" ma:contentTypeVersion="13" ma:contentTypeDescription="Create a new document." ma:contentTypeScope="" ma:versionID="1136095aeba14c76d3b5daf33cacb3d4">
   <xsd:schema xmlns:xsd="http://www.w3.org/2001/XMLSchema" xmlns:xs="http://www.w3.org/2001/XMLSchema" xmlns:p="http://schemas.microsoft.com/office/2006/metadata/properties" xmlns:ns3="50c6f0d6-8741-4da4-b08f-402b0ce19755" xmlns:ns4="29791920-2275-484b-95df-8920050dfdd8" targetNamespace="http://schemas.microsoft.com/office/2006/metadata/properties" ma:root="true" ma:fieldsID="0368936cfa1d9e469dc08934c908f5f6" ns3:_="" ns4:_="">
     <xsd:import namespace="50c6f0d6-8741-4da4-b08f-402b0ce19755"/>
@@ -4525,22 +4540,24 @@
 </ct:contentTypeSchema>
 </file>
 
-<file path=customXml/item2.xml><?xml version="1.0" encoding="utf-8"?>
-<?mso-contentType ?>
-<FormTemplates xmlns="http://schemas.microsoft.com/sharepoint/v3/contenttype/forms">
-  <Display>DocumentLibraryForm</Display>
-  <Edit>DocumentLibraryForm</Edit>
-  <New>DocumentLibraryForm</New>
-</FormTemplates>
+<file path=customXml/itemProps1.xml><?xml version="1.0" encoding="utf-8"?>
+<ds:datastoreItem xmlns:ds="http://schemas.openxmlformats.org/officeDocument/2006/customXml" ds:itemID="{AB4BF9C7-97FC-4E46-9E57-8C75F73B61CC}">
+  <ds:schemaRefs>
+    <ds:schemaRef ds:uri="http://schemas.microsoft.com/office/2006/metadata/properties"/>
+    <ds:schemaRef ds:uri="http://schemas.microsoft.com/office/infopath/2007/PartnerControls"/>
+  </ds:schemaRefs>
+</ds:datastoreItem>
 </file>
 
-<file path=customXml/item3.xml><?xml version="1.0" encoding="utf-8"?>
-<p:properties xmlns:p="http://schemas.microsoft.com/office/2006/metadata/properties" xmlns:xsi="http://www.w3.org/2001/XMLSchema-instance" xmlns:pc="http://schemas.microsoft.com/office/infopath/2007/PartnerControls">
-  <documentManagement/>
-</p:properties>
+<file path=customXml/itemProps2.xml><?xml version="1.0" encoding="utf-8"?>
+<ds:datastoreItem xmlns:ds="http://schemas.openxmlformats.org/officeDocument/2006/customXml" ds:itemID="{45B64A6E-69D6-4F49-B719-CD0579827FCA}">
+  <ds:schemaRefs>
+    <ds:schemaRef ds:uri="http://schemas.microsoft.com/sharepoint/v3/contenttype/forms"/>
+  </ds:schemaRefs>
+</ds:datastoreItem>
 </file>
 
-<file path=customXml/itemProps1.xml><?xml version="1.0" encoding="utf-8"?>
+<file path=customXml/itemProps3.xml><?xml version="1.0" encoding="utf-8"?>
 <ds:datastoreItem xmlns:ds="http://schemas.openxmlformats.org/officeDocument/2006/customXml" ds:itemID="{61F38E4C-0B96-47EA-A232-01C42CB9BA75}">
   <ds:schemaRefs>
     <ds:schemaRef ds:uri="http://schemas.microsoft.com/office/2006/metadata/contentType"/>
@@ -4557,21 +4574,4 @@
     <ds:schemaRef ds:uri="http://schemas.microsoft.com/internal/obd"/>
   </ds:schemaRefs>
 </ds:datastoreItem>
-</file>
-
-<file path=customXml/itemProps2.xml><?xml version="1.0" encoding="utf-8"?>
-<ds:datastoreItem xmlns:ds="http://schemas.openxmlformats.org/officeDocument/2006/customXml" ds:itemID="{45B64A6E-69D6-4F49-B719-CD0579827FCA}">
-  <ds:schemaRefs>
-    <ds:schemaRef ds:uri="http://schemas.microsoft.com/sharepoint/v3/contenttype/forms"/>
-  </ds:schemaRefs>
-</ds:datastoreItem>
-</file>
-
-<file path=customXml/itemProps3.xml><?xml version="1.0" encoding="utf-8"?>
-<ds:datastoreItem xmlns:ds="http://schemas.openxmlformats.org/officeDocument/2006/customXml" ds:itemID="{AB4BF9C7-97FC-4E46-9E57-8C75F73B61CC}">
-  <ds:schemaRefs>
-    <ds:schemaRef ds:uri="http://schemas.microsoft.com/office/2006/metadata/properties"/>
-    <ds:schemaRef ds:uri="http://schemas.microsoft.com/office/infopath/2007/PartnerControls"/>
-  </ds:schemaRefs>
-</ds:datastoreItem>
 </file>
</xml_diff>